<commit_message>
ownerClass added.  WIP:  The player and computer can now purchase property.
</commit_message>
<xml_diff>
--- a/game documents/Week 3.pptx
+++ b/game documents/Week 3.pptx
@@ -7,8 +7,7 @@
   <p:sldIdLst>
     <p:sldId id="256" r:id="rId2"/>
     <p:sldId id="257" r:id="rId3"/>
-    <p:sldId id="259" r:id="rId4"/>
-    <p:sldId id="258" r:id="rId5"/>
+    <p:sldId id="258" r:id="rId4"/>
   </p:sldIdLst>
   <p:sldSz cx="12192000" cy="6858000"/>
   <p:notesSz cx="6858000" cy="9144000"/>
@@ -324,11 +323,11 @@
           <c:showBubbleSize val="0"/>
         </c:dLbls>
         <c:smooth val="0"/>
-        <c:axId val="253442000"/>
-        <c:axId val="253447096"/>
+        <c:axId val="299851800"/>
+        <c:axId val="299852976"/>
       </c:lineChart>
       <c:catAx>
-        <c:axId val="253442000"/>
+        <c:axId val="299851800"/>
         <c:scaling>
           <c:orientation val="minMax"/>
         </c:scaling>
@@ -371,7 +370,7 @@
             <a:endParaRPr lang="en-US"/>
           </a:p>
         </c:txPr>
-        <c:crossAx val="253447096"/>
+        <c:crossAx val="299852976"/>
         <c:crosses val="autoZero"/>
         <c:auto val="1"/>
         <c:lblAlgn val="ctr"/>
@@ -379,7 +378,7 @@
         <c:noMultiLvlLbl val="0"/>
       </c:catAx>
       <c:valAx>
-        <c:axId val="253447096"/>
+        <c:axId val="299852976"/>
         <c:scaling>
           <c:orientation val="minMax"/>
         </c:scaling>
@@ -430,7 +429,7 @@
             <a:endParaRPr lang="en-US"/>
           </a:p>
         </c:txPr>
-        <c:crossAx val="253442000"/>
+        <c:crossAx val="299851800"/>
         <c:crosses val="autoZero"/>
         <c:crossBetween val="between"/>
       </c:valAx>
@@ -1460,7 +1459,7 @@
           <a:p>
             <a:fld id="{83284890-85D2-4D7B-8EF5-15A9C1DB8F42}" type="datetimeFigureOut">
               <a:rPr lang="en-US" dirty="0"/>
-              <a:t>7/25/2020</a:t>
+              <a:t>7/26/2020</a:t>
             </a:fld>
             <a:endParaRPr lang="en-US" dirty="0"/>
           </a:p>
@@ -1635,7 +1634,7 @@
           <a:p>
             <a:fld id="{87157CC2-0FC8-4686-B024-99790E0F5162}" type="datetimeFigureOut">
               <a:rPr lang="en-US" dirty="0"/>
-              <a:t>7/25/2020</a:t>
+              <a:t>7/26/2020</a:t>
             </a:fld>
             <a:endParaRPr lang="en-US" dirty="0"/>
           </a:p>
@@ -1810,7 +1809,7 @@
           <a:p>
             <a:fld id="{F6764DA5-CD3D-4590-A511-FCD3BC7A793E}" type="datetimeFigureOut">
               <a:rPr lang="en-US" dirty="0"/>
-              <a:t>7/25/2020</a:t>
+              <a:t>7/26/2020</a:t>
             </a:fld>
             <a:endParaRPr lang="en-US" dirty="0"/>
           </a:p>
@@ -1975,7 +1974,7 @@
           <a:p>
             <a:fld id="{82F5661D-6934-4B32-B92C-470368BF1EC6}" type="datetimeFigureOut">
               <a:rPr lang="en-US" dirty="0"/>
-              <a:t>7/25/2020</a:t>
+              <a:t>7/26/2020</a:t>
             </a:fld>
             <a:endParaRPr lang="en-US" dirty="0"/>
           </a:p>
@@ -2283,7 +2282,7 @@
           <a:p>
             <a:fld id="{C6F822A4-8DA6-4447-9B1F-C5DB58435268}" type="datetimeFigureOut">
               <a:rPr lang="en-US" dirty="0"/>
-              <a:t>7/25/2020</a:t>
+              <a:t>7/26/2020</a:t>
             </a:fld>
             <a:endParaRPr lang="en-US" dirty="0"/>
           </a:p>
@@ -2665,7 +2664,7 @@
           <a:p>
             <a:fld id="{E548D31E-DCDA-41A7-9C67-C4B11B94D21D}" type="datetimeFigureOut">
               <a:rPr lang="en-US" dirty="0"/>
-              <a:t>7/25/2020</a:t>
+              <a:t>7/26/2020</a:t>
             </a:fld>
             <a:endParaRPr lang="en-US" dirty="0"/>
           </a:p>
@@ -3094,7 +3093,7 @@
           <a:p>
             <a:fld id="{9B3762C0-B258-48F1-ADE6-176B4174CCDD}" type="datetimeFigureOut">
               <a:rPr lang="en-US" dirty="0"/>
-              <a:t>7/25/2020</a:t>
+              <a:t>7/26/2020</a:t>
             </a:fld>
             <a:endParaRPr lang="en-US" dirty="0"/>
           </a:p>
@@ -3207,7 +3206,7 @@
           <a:p>
             <a:fld id="{677919A6-33EB-49BD-A62F-1FA56B9F9712}" type="datetimeFigureOut">
               <a:rPr lang="en-US" dirty="0"/>
-              <a:t>7/25/2020</a:t>
+              <a:t>7/26/2020</a:t>
             </a:fld>
             <a:endParaRPr lang="en-US" dirty="0"/>
           </a:p>
@@ -3297,7 +3296,7 @@
           <a:p>
             <a:fld id="{CA4E7D1B-D673-4CF6-8672-009D42ABD2A0}" type="datetimeFigureOut">
               <a:rPr lang="en-US" dirty="0"/>
-              <a:t>7/25/2020</a:t>
+              <a:t>7/26/2020</a:t>
             </a:fld>
             <a:endParaRPr lang="en-US" dirty="0"/>
           </a:p>
@@ -3642,7 +3641,7 @@
           <a:p>
             <a:fld id="{DA16AA21-1863-4931-97CB-99D0A168701B}" type="datetimeFigureOut">
               <a:rPr lang="en-US" dirty="0"/>
-              <a:t>7/25/2020</a:t>
+              <a:t>7/26/2020</a:t>
             </a:fld>
             <a:endParaRPr lang="en-US" dirty="0"/>
           </a:p>
@@ -4062,7 +4061,7 @@
           <a:p>
             <a:fld id="{3772C379-9A7C-4C87-A116-CBE9F58B04C5}" type="datetimeFigureOut">
               <a:rPr lang="en-US" dirty="0"/>
-              <a:t>7/25/2020</a:t>
+              <a:t>7/26/2020</a:t>
             </a:fld>
             <a:endParaRPr lang="en-US" dirty="0"/>
           </a:p>
@@ -4338,7 +4337,7 @@
           <a:p>
             <a:fld id="{8664C608-40B1-4030-A28D-5B74BC98ADCE}" type="datetimeFigureOut">
               <a:rPr lang="en-US" dirty="0"/>
-              <a:t>7/25/2020</a:t>
+              <a:t>7/26/2020</a:t>
             </a:fld>
             <a:endParaRPr lang="en-US" dirty="0"/>
           </a:p>
@@ -4954,11 +4953,7 @@
           <a:p>
             <a:r>
               <a:rPr lang="en-US" dirty="0" smtClean="0"/>
-              <a:t>Week </a:t>
-            </a:r>
-            <a:r>
-              <a:rPr lang="en-US" dirty="0" smtClean="0"/>
-              <a:t>3:  </a:t>
+              <a:t>Week 3:  </a:t>
             </a:r>
             <a:r>
               <a:rPr lang="en-US" dirty="0" smtClean="0">
@@ -4966,7 +4961,7 @@
                   <a:srgbClr val="FF0000"/>
                 </a:solidFill>
               </a:rPr>
-              <a:t>7/25/2020</a:t>
+              <a:t>7/26/2020</a:t>
             </a:r>
             <a:endParaRPr lang="en-US" dirty="0" smtClean="0"/>
           </a:p>
@@ -4976,12 +4971,12 @@
               <a:t>7/20/2020 </a:t>
             </a:r>
             <a:r>
-              <a:rPr lang="en-US" dirty="0" smtClean="0"/>
+              <a:rPr lang="en-US" smtClean="0"/>
               <a:t>through </a:t>
             </a:r>
             <a:r>
-              <a:rPr lang="en-US" dirty="0" smtClean="0"/>
-              <a:t>7/25/2020</a:t>
+              <a:rPr lang="en-US" smtClean="0"/>
+              <a:t>7/26/2020</a:t>
             </a:r>
             <a:endParaRPr lang="en-US" dirty="0" smtClean="0">
               <a:solidFill>
@@ -5145,7 +5140,9 @@
         </p:nvSpPr>
         <p:spPr/>
         <p:txBody>
-          <a:bodyPr/>
+          <a:bodyPr>
+            <a:normAutofit lnSpcReduction="10000"/>
+          </a:bodyPr>
           <a:lstStyle/>
           <a:p>
             <a:pPr marL="274320" lvl="1" indent="0">
@@ -5170,7 +5167,6 @@
               <a:rPr lang="en-US" dirty="0" smtClean="0"/>
               <a:t>People get very hungry at the start of the month</a:t>
             </a:r>
-            <a:endParaRPr lang="en-US" dirty="0" smtClean="0"/>
           </a:p>
           <a:p>
             <a:pPr lvl="1"/>
@@ -5217,12 +5213,32 @@
             <a:pPr lvl="1"/>
             <a:r>
               <a:rPr lang="en-US" dirty="0" smtClean="0"/>
-              <a:t>Sound Engine</a:t>
-            </a:r>
-            <a:endParaRPr lang="en-US" dirty="0" smtClean="0"/>
+              <a:t>Sound </a:t>
+            </a:r>
+            <a:r>
+              <a:rPr lang="en-US" dirty="0" smtClean="0"/>
+              <a:t>Engine</a:t>
+            </a:r>
           </a:p>
           <a:p>
             <a:pPr lvl="1"/>
+            <a:endParaRPr lang="en-US" dirty="0"/>
+          </a:p>
+          <a:p>
+            <a:pPr marL="274320" lvl="1" indent="0">
+              <a:buNone/>
+            </a:pPr>
+            <a:r>
+              <a:rPr lang="en-US" b="1" u="sng" dirty="0" smtClean="0"/>
+              <a:t>Gabriel Cornish</a:t>
+            </a:r>
+          </a:p>
+          <a:p>
+            <a:pPr lvl="1"/>
+            <a:r>
+              <a:rPr lang="en-US" dirty="0" smtClean="0"/>
+              <a:t>Day Counter</a:t>
+            </a:r>
             <a:endParaRPr lang="en-US" dirty="0"/>
           </a:p>
           <a:p>
@@ -5303,187 +5319,9 @@
         </p:nvSpPr>
         <p:spPr/>
         <p:txBody>
-          <a:bodyPr>
-            <a:normAutofit/>
-          </a:bodyPr>
-          <a:lstStyle/>
-          <a:p>
-            <a:pPr marL="274320" lvl="1" indent="0">
-              <a:buNone/>
-            </a:pPr>
-            <a:r>
-              <a:rPr lang="en-US" u="sng" dirty="0" err="1" smtClean="0"/>
-              <a:t>EyeForcz</a:t>
-            </a:r>
-            <a:endParaRPr lang="en-US" u="sng" dirty="0" smtClean="0"/>
-          </a:p>
-          <a:p>
-            <a:pPr lvl="1"/>
-            <a:r>
-              <a:rPr lang="en-US" dirty="0" smtClean="0"/>
-              <a:t>Added Debug and Cheat code functions</a:t>
-            </a:r>
-          </a:p>
-          <a:p>
-            <a:pPr lvl="1"/>
-            <a:endParaRPr lang="en-US" u="sng" dirty="0"/>
-          </a:p>
-          <a:p>
-            <a:pPr marL="274320" lvl="1" indent="0">
-              <a:buNone/>
-            </a:pPr>
-            <a:r>
-              <a:rPr lang="en-US" u="sng" dirty="0" smtClean="0"/>
-              <a:t>Gonzalo Delgado</a:t>
-            </a:r>
-          </a:p>
-          <a:p>
-            <a:pPr lvl="1"/>
-            <a:r>
-              <a:rPr lang="en-US" dirty="0" smtClean="0"/>
-              <a:t>Fixed Case-Sensitive Bug</a:t>
-            </a:r>
-          </a:p>
-          <a:p>
-            <a:pPr lvl="1"/>
-            <a:endParaRPr lang="en-US" dirty="0"/>
-          </a:p>
-          <a:p>
-            <a:pPr marL="274320" lvl="1" indent="0">
-              <a:buNone/>
-            </a:pPr>
-            <a:r>
-              <a:rPr lang="en-US" dirty="0" err="1" smtClean="0"/>
-              <a:t>Michelly</a:t>
-            </a:r>
-            <a:r>
-              <a:rPr lang="en-US" dirty="0" smtClean="0"/>
-              <a:t>-Oliveira</a:t>
-            </a:r>
-          </a:p>
-          <a:p>
-            <a:pPr lvl="1"/>
-            <a:r>
-              <a:rPr lang="en-US" dirty="0" err="1" smtClean="0"/>
-              <a:t>peopleCharacteristics</a:t>
-            </a:r>
-            <a:r>
-              <a:rPr lang="en-US" dirty="0" smtClean="0"/>
-              <a:t> class</a:t>
-            </a:r>
-          </a:p>
-          <a:p>
-            <a:pPr lvl="1"/>
-            <a:r>
-              <a:rPr lang="en-US" dirty="0" smtClean="0"/>
-              <a:t>Pause Game</a:t>
-            </a:r>
-          </a:p>
-          <a:p>
-            <a:pPr lvl="1"/>
-            <a:endParaRPr lang="en-US" u="sng" dirty="0"/>
-          </a:p>
-          <a:p>
-            <a:pPr marL="274320" lvl="1" indent="0">
-              <a:buNone/>
-            </a:pPr>
-            <a:r>
-              <a:rPr lang="en-US" u="sng" dirty="0" smtClean="0"/>
-              <a:t>Vince McKeown</a:t>
-            </a:r>
-          </a:p>
-          <a:p>
-            <a:pPr lvl="1"/>
-            <a:r>
-              <a:rPr lang="en-US" dirty="0" smtClean="0"/>
-              <a:t>Game States</a:t>
-            </a:r>
-          </a:p>
-          <a:p>
-            <a:pPr lvl="1"/>
-            <a:endParaRPr lang="en-US" dirty="0"/>
-          </a:p>
-          <a:p>
-            <a:pPr lvl="1"/>
-            <a:endParaRPr lang="en-US" dirty="0"/>
-          </a:p>
-        </p:txBody>
-      </p:sp>
-    </p:spTree>
-    <p:extLst>
-      <p:ext uri="{BB962C8B-B14F-4D97-AF65-F5344CB8AC3E}">
-        <p14:creationId xmlns:p14="http://schemas.microsoft.com/office/powerpoint/2010/main" val="701477140"/>
-      </p:ext>
-    </p:extLst>
-  </p:cSld>
-  <p:clrMapOvr>
-    <a:masterClrMapping/>
-  </p:clrMapOvr>
-</p:sld>
-</file>
-
-<file path=ppt/slides/slide4.xml><?xml version="1.0" encoding="utf-8"?>
-<p:sld xmlns:a="http://schemas.openxmlformats.org/drawingml/2006/main" xmlns:r="http://schemas.openxmlformats.org/officeDocument/2006/relationships" xmlns:p="http://schemas.openxmlformats.org/presentationml/2006/main">
-  <p:cSld>
-    <p:spTree>
-      <p:nvGrpSpPr>
-        <p:cNvPr id="1" name=""/>
-        <p:cNvGrpSpPr/>
-        <p:nvPr/>
-      </p:nvGrpSpPr>
-      <p:grpSpPr>
-        <a:xfrm>
-          <a:off x="0" y="0"/>
-          <a:ext cx="0" cy="0"/>
-          <a:chOff x="0" y="0"/>
-          <a:chExt cx="0" cy="0"/>
-        </a:xfrm>
-      </p:grpSpPr>
-      <p:sp>
-        <p:nvSpPr>
-          <p:cNvPr id="2" name="Title 1"/>
-          <p:cNvSpPr>
-            <a:spLocks noGrp="1"/>
-          </p:cNvSpPr>
-          <p:nvPr>
-            <p:ph type="title"/>
-          </p:nvPr>
-        </p:nvSpPr>
-        <p:spPr/>
-        <p:txBody>
           <a:bodyPr/>
           <a:lstStyle/>
           <a:p>
-            <a:r>
-              <a:rPr lang="en-US" dirty="0" smtClean="0"/>
-              <a:t>Springfield  property manager</a:t>
-            </a:r>
-            <a:br>
-              <a:rPr lang="en-US" dirty="0" smtClean="0"/>
-            </a:br>
-            <a:r>
-              <a:rPr lang="en-US" b="1" dirty="0" smtClean="0"/>
-              <a:t>Code</a:t>
-            </a:r>
-            <a:endParaRPr lang="en-US" b="1" dirty="0"/>
-          </a:p>
-        </p:txBody>
-      </p:sp>
-      <p:sp>
-        <p:nvSpPr>
-          <p:cNvPr id="3" name="Content Placeholder 2"/>
-          <p:cNvSpPr>
-            <a:spLocks noGrp="1"/>
-          </p:cNvSpPr>
-          <p:nvPr>
-            <p:ph idx="1"/>
-          </p:nvPr>
-        </p:nvSpPr>
-        <p:spPr/>
-        <p:txBody>
-          <a:bodyPr/>
-          <a:lstStyle/>
-          <a:p>
             <a:pPr marL="274320" lvl="1" indent="0">
               <a:buNone/>
             </a:pPr>
@@ -5491,7 +5329,6 @@
               <a:rPr lang="en-US" b="1" u="sng" dirty="0" smtClean="0"/>
               <a:t>Casio101</a:t>
             </a:r>
-            <a:endParaRPr lang="en-US" b="1" u="sng" dirty="0" smtClean="0"/>
           </a:p>
           <a:p>
             <a:pPr lvl="1"/>
@@ -5499,7 +5336,6 @@
               <a:rPr lang="en-US" dirty="0" smtClean="0"/>
               <a:t>Brazilian Steakhouse</a:t>
             </a:r>
-            <a:endParaRPr lang="en-US" dirty="0" smtClean="0"/>
           </a:p>
           <a:p>
             <a:pPr lvl="1"/>
@@ -5661,8 +5497,9 @@
             </a:pPr>
             <a:r>
               <a:rPr lang="en-US" b="1" u="sng" dirty="0" smtClean="0"/>
-              <a:t>Casio101</a:t>
-            </a:r>
+              <a:t>Gabriel Cornish</a:t>
+            </a:r>
+            <a:endParaRPr lang="en-US" b="1" u="sng" dirty="0" smtClean="0"/>
           </a:p>
           <a:p>
             <a:pPr marL="560070" lvl="1" indent="-285750">

</xml_diff>